<commit_message>
updatie_docs and watchdoc are now working fine.
</commit_message>
<xml_diff>
--- a/Notebooks/English/03 - Identity features/01 - Introduction - Learn  Microsoft Docs.pptx
+++ b/Notebooks/English/03 - Identity features/01 - Introduction - Learn  Microsoft Docs.pptx
@@ -3717,6 +3717,18 @@
             <a:r>
               <a:rPr/>
               <a:t>.</a:t>
+            </a:r>
+          </a:p>
+          <a:p>
+            <a:pPr lvl="0" indent="0" marL="0">
+              <a:spcBef>
+                <a:spcPts val="3000"/>
+              </a:spcBef>
+              <a:buNone/>
+            </a:pPr>
+            <a:r>
+              <a:rPr b="1"/>
+              <a:t>Sandbox header</a:t>
             </a:r>
           </a:p>
         </p:txBody>

</xml_diff>